<commit_message>
Class Dated 25.09.2023 added code into login page
</commit_message>
<xml_diff>
--- a/project.pptx
+++ b/project.pptx
@@ -277,7 +277,7 @@
           <a:p>
             <a:fld id="{756090CF-B298-4534-AD23-AB8589173D38}" type="datetimeFigureOut">
               <a:rPr lang="en-IN" smtClean="0"/>
-              <a:t>24-09-2023</a:t>
+              <a:t>25-09-2023</a:t>
             </a:fld>
             <a:endParaRPr lang="en-IN"/>
           </a:p>
@@ -477,7 +477,7 @@
           <a:p>
             <a:fld id="{756090CF-B298-4534-AD23-AB8589173D38}" type="datetimeFigureOut">
               <a:rPr lang="en-IN" smtClean="0"/>
-              <a:t>24-09-2023</a:t>
+              <a:t>25-09-2023</a:t>
             </a:fld>
             <a:endParaRPr lang="en-IN"/>
           </a:p>
@@ -687,7 +687,7 @@
           <a:p>
             <a:fld id="{756090CF-B298-4534-AD23-AB8589173D38}" type="datetimeFigureOut">
               <a:rPr lang="en-IN" smtClean="0"/>
-              <a:t>24-09-2023</a:t>
+              <a:t>25-09-2023</a:t>
             </a:fld>
             <a:endParaRPr lang="en-IN"/>
           </a:p>
@@ -887,7 +887,7 @@
           <a:p>
             <a:fld id="{756090CF-B298-4534-AD23-AB8589173D38}" type="datetimeFigureOut">
               <a:rPr lang="en-IN" smtClean="0"/>
-              <a:t>24-09-2023</a:t>
+              <a:t>25-09-2023</a:t>
             </a:fld>
             <a:endParaRPr lang="en-IN"/>
           </a:p>
@@ -1163,7 +1163,7 @@
           <a:p>
             <a:fld id="{756090CF-B298-4534-AD23-AB8589173D38}" type="datetimeFigureOut">
               <a:rPr lang="en-IN" smtClean="0"/>
-              <a:t>24-09-2023</a:t>
+              <a:t>25-09-2023</a:t>
             </a:fld>
             <a:endParaRPr lang="en-IN"/>
           </a:p>
@@ -1431,7 +1431,7 @@
           <a:p>
             <a:fld id="{756090CF-B298-4534-AD23-AB8589173D38}" type="datetimeFigureOut">
               <a:rPr lang="en-IN" smtClean="0"/>
-              <a:t>24-09-2023</a:t>
+              <a:t>25-09-2023</a:t>
             </a:fld>
             <a:endParaRPr lang="en-IN"/>
           </a:p>
@@ -1846,7 +1846,7 @@
           <a:p>
             <a:fld id="{756090CF-B298-4534-AD23-AB8589173D38}" type="datetimeFigureOut">
               <a:rPr lang="en-IN" smtClean="0"/>
-              <a:t>24-09-2023</a:t>
+              <a:t>25-09-2023</a:t>
             </a:fld>
             <a:endParaRPr lang="en-IN"/>
           </a:p>
@@ -1988,7 +1988,7 @@
           <a:p>
             <a:fld id="{756090CF-B298-4534-AD23-AB8589173D38}" type="datetimeFigureOut">
               <a:rPr lang="en-IN" smtClean="0"/>
-              <a:t>24-09-2023</a:t>
+              <a:t>25-09-2023</a:t>
             </a:fld>
             <a:endParaRPr lang="en-IN"/>
           </a:p>
@@ -2101,7 +2101,7 @@
           <a:p>
             <a:fld id="{756090CF-B298-4534-AD23-AB8589173D38}" type="datetimeFigureOut">
               <a:rPr lang="en-IN" smtClean="0"/>
-              <a:t>24-09-2023</a:t>
+              <a:t>25-09-2023</a:t>
             </a:fld>
             <a:endParaRPr lang="en-IN"/>
           </a:p>
@@ -2414,7 +2414,7 @@
           <a:p>
             <a:fld id="{756090CF-B298-4534-AD23-AB8589173D38}" type="datetimeFigureOut">
               <a:rPr lang="en-IN" smtClean="0"/>
-              <a:t>24-09-2023</a:t>
+              <a:t>25-09-2023</a:t>
             </a:fld>
             <a:endParaRPr lang="en-IN"/>
           </a:p>
@@ -2703,7 +2703,7 @@
           <a:p>
             <a:fld id="{756090CF-B298-4534-AD23-AB8589173D38}" type="datetimeFigureOut">
               <a:rPr lang="en-IN" smtClean="0"/>
-              <a:t>24-09-2023</a:t>
+              <a:t>25-09-2023</a:t>
             </a:fld>
             <a:endParaRPr lang="en-IN"/>
           </a:p>
@@ -2946,7 +2946,7 @@
           <a:p>
             <a:fld id="{756090CF-B298-4534-AD23-AB8589173D38}" type="datetimeFigureOut">
               <a:rPr lang="en-IN" smtClean="0"/>
-              <a:t>24-09-2023</a:t>
+              <a:t>25-09-2023</a:t>
             </a:fld>
             <a:endParaRPr lang="en-IN"/>
           </a:p>
@@ -6696,20 +6696,20 @@
       </p:grpSpPr>
       <p:sp>
         <p:nvSpPr>
-          <p:cNvPr id="4" name="Rectangle 3">
-            <a:extLst>
-              <a:ext uri="{FF2B5EF4-FFF2-40B4-BE49-F238E27FC236}">
-                <a16:creationId xmlns:a16="http://schemas.microsoft.com/office/drawing/2014/main" id="{34645F37-0A08-FE85-AD9E-2B538E8F2DF8}"/>
-              </a:ext>
-            </a:extLst>
-          </p:cNvPr>
-          <p:cNvSpPr/>
-          <p:nvPr/>
-        </p:nvSpPr>
-        <p:spPr>
-          <a:xfrm>
-            <a:off x="4774967" y="2967335"/>
-            <a:ext cx="2642070" cy="923330"/>
+          <p:cNvPr id="2" name="TextBox 1">
+            <a:extLst>
+              <a:ext uri="{FF2B5EF4-FFF2-40B4-BE49-F238E27FC236}">
+                <a16:creationId xmlns:a16="http://schemas.microsoft.com/office/drawing/2014/main" id="{64C8C91F-BF1E-A77C-2325-AA6319161FB9}"/>
+              </a:ext>
+            </a:extLst>
+          </p:cNvPr>
+          <p:cNvSpPr txBox="1"/>
+          <p:nvPr/>
+        </p:nvSpPr>
+        <p:spPr>
+          <a:xfrm>
+            <a:off x="210312" y="201168"/>
+            <a:ext cx="11804904" cy="1754326"/>
           </a:xfrm>
           <a:prstGeom prst="rect">
             <a:avLst/>
@@ -6717,48 +6717,67 @@
           <a:noFill/>
         </p:spPr>
         <p:txBody>
-          <a:bodyPr wrap="none" lIns="91440" tIns="45720" rIns="91440" bIns="45720">
+          <a:bodyPr wrap="square" rtlCol="0">
             <a:spAutoFit/>
           </a:bodyPr>
           <a:lstStyle/>
           <a:p>
-            <a:pPr algn="ctr"/>
-            <a:r>
-              <a:rPr lang="en-US" sz="5400" b="1">
-                <a:ln w="9525">
-                  <a:solidFill>
-                    <a:schemeClr val="bg1"/>
-                  </a:solidFill>
-                  <a:prstDash val="solid"/>
-                </a:ln>
-                <a:effectLst>
-                  <a:outerShdw blurRad="12700" dist="38100" dir="2700000" algn="tl" rotWithShape="0">
-                    <a:schemeClr val="bg1">
-                      <a:lumMod val="50000"/>
-                    </a:schemeClr>
-                  </a:outerShdw>
-                </a:effectLst>
-              </a:rPr>
-              <a:t>Slide -17</a:t>
-            </a:r>
-            <a:endParaRPr lang="en-US" sz="5400" b="1" cap="none" spc="0" dirty="0">
-              <a:ln w="9525">
-                <a:solidFill>
-                  <a:schemeClr val="bg1"/>
-                </a:solidFill>
-                <a:prstDash val="solid"/>
-              </a:ln>
-              <a:solidFill>
-                <a:schemeClr val="tx1"/>
-              </a:solidFill>
-              <a:effectLst>
-                <a:outerShdw blurRad="12700" dist="38100" dir="2700000" algn="tl" rotWithShape="0">
-                  <a:schemeClr val="bg1">
-                    <a:lumMod val="50000"/>
-                  </a:schemeClr>
-                </a:outerShdw>
-              </a:effectLst>
-            </a:endParaRPr>
+            <a:pPr marL="342900" indent="-342900">
+              <a:buAutoNum type="arabicPeriod"/>
+            </a:pPr>
+            <a:r>
+              <a:rPr lang="en-US" b="1" u="sng" dirty="0"/>
+              <a:t>If User Name text box is blank show message to user to enter user name</a:t>
+            </a:r>
+          </a:p>
+          <a:p>
+            <a:pPr marL="342900" indent="-342900">
+              <a:buAutoNum type="arabicPeriod"/>
+            </a:pPr>
+            <a:r>
+              <a:rPr lang="en-US" b="1" u="sng" dirty="0"/>
+              <a:t>If Password text box is blank show message to user to enter password</a:t>
+            </a:r>
+          </a:p>
+          <a:p>
+            <a:pPr marL="342900" indent="-342900">
+              <a:buAutoNum type="arabicPeriod"/>
+            </a:pPr>
+            <a:r>
+              <a:rPr lang="en-US" b="1" u="sng" dirty="0"/>
+              <a:t>Check whether entered User name is correct in respect of email format…if not show user a message</a:t>
+            </a:r>
+          </a:p>
+          <a:p>
+            <a:pPr marL="342900" indent="-342900">
+              <a:buAutoNum type="arabicPeriod"/>
+            </a:pPr>
+            <a:r>
+              <a:rPr lang="en-US" dirty="0"/>
+              <a:t>If every thing above is </a:t>
+            </a:r>
+            <a:r>
+              <a:rPr lang="en-US" dirty="0" err="1"/>
+              <a:t>fine..then</a:t>
+            </a:r>
+            <a:r>
+              <a:rPr lang="en-US" dirty="0"/>
+              <a:t> check whether username and password is matching with the data available in the server and throw message if not matched…..if matched…redirect to </a:t>
+            </a:r>
+            <a:r>
+              <a:rPr lang="en-US" dirty="0" err="1"/>
+              <a:t>DashBoard</a:t>
+            </a:r>
+            <a:r>
+              <a:rPr lang="en-US" dirty="0"/>
+              <a:t> page…</a:t>
+            </a:r>
+          </a:p>
+          <a:p>
+            <a:pPr marL="342900" indent="-342900">
+              <a:buAutoNum type="arabicPeriod"/>
+            </a:pPr>
+            <a:endParaRPr lang="en-IN" dirty="0"/>
           </a:p>
         </p:txBody>
       </p:sp>

</xml_diff>